<commit_message>
sentencia git init. primera rama creada
</commit_message>
<xml_diff>
--- a/joseMarroquin.pptx
+++ b/joseMarroquin.pptx
@@ -6,6 +6,7 @@
   </p:sldMasterIdLst>
   <p:sldIdLst>
     <p:sldId id="256" r:id="rId2"/>
+    <p:sldId id="257" r:id="rId3"/>
   </p:sldIdLst>
   <p:sldSz cx="12192000" cy="6858000"/>
   <p:notesSz cx="6858000" cy="9144000"/>
@@ -104,6 +105,11 @@
       </a:defRPr>
     </a:lvl9pPr>
   </p:defaultTextStyle>
+  <p:extLst>
+    <p:ext uri="{EFAFB233-063F-42B5-8137-9DF3F51BA10A}">
+      <p15:sldGuideLst xmlns:p15="http://schemas.microsoft.com/office/powerpoint/2012/main"/>
+    </p:ext>
+  </p:extLst>
 </p:presentation>
 </file>
 
@@ -3042,6 +3048,99 @@
 </p:sld>
 </file>
 
+<file path=ppt/slides/slide2.xml><?xml version="1.0" encoding="utf-8"?>
+<p:sld xmlns:a="http://schemas.openxmlformats.org/drawingml/2006/main" xmlns:r="http://schemas.openxmlformats.org/officeDocument/2006/relationships" xmlns:p="http://schemas.openxmlformats.org/presentationml/2006/main">
+  <p:cSld>
+    <p:spTree>
+      <p:nvGrpSpPr>
+        <p:cNvPr id="1" name=""/>
+        <p:cNvGrpSpPr/>
+        <p:nvPr/>
+      </p:nvGrpSpPr>
+      <p:grpSpPr>
+        <a:xfrm>
+          <a:off x="0" y="0"/>
+          <a:ext cx="0" cy="0"/>
+          <a:chOff x="0" y="0"/>
+          <a:chExt cx="0" cy="0"/>
+        </a:xfrm>
+      </p:grpSpPr>
+      <p:sp>
+        <p:nvSpPr>
+          <p:cNvPr id="2" name="Título 1"/>
+          <p:cNvSpPr>
+            <a:spLocks noGrp="1"/>
+          </p:cNvSpPr>
+          <p:nvPr>
+            <p:ph type="title"/>
+          </p:nvPr>
+        </p:nvSpPr>
+        <p:spPr/>
+        <p:txBody>
+          <a:bodyPr/>
+          <a:lstStyle/>
+          <a:p>
+            <a:pPr algn="ctr"/>
+            <a:r>
+              <a:rPr lang="es-GT" dirty="0" err="1" smtClean="0"/>
+              <a:t>git</a:t>
+            </a:r>
+            <a:r>
+              <a:rPr lang="es-GT" dirty="0" smtClean="0"/>
+              <a:t> </a:t>
+            </a:r>
+            <a:r>
+              <a:rPr lang="es-GT" dirty="0" err="1" smtClean="0"/>
+              <a:t>init</a:t>
+            </a:r>
+            <a:endParaRPr lang="es-ES" dirty="0"/>
+          </a:p>
+        </p:txBody>
+      </p:sp>
+      <p:sp>
+        <p:nvSpPr>
+          <p:cNvPr id="3" name="Marcador de contenido 2"/>
+          <p:cNvSpPr>
+            <a:spLocks noGrp="1"/>
+          </p:cNvSpPr>
+          <p:nvPr>
+            <p:ph idx="1"/>
+          </p:nvPr>
+        </p:nvSpPr>
+        <p:spPr/>
+        <p:txBody>
+          <a:bodyPr/>
+          <a:lstStyle/>
+          <a:p>
+            <a:r>
+              <a:rPr lang="es-GT" dirty="0"/>
+              <a:t>Crea un repositorio </a:t>
+            </a:r>
+            <a:r>
+              <a:rPr lang="es-GT" dirty="0" err="1"/>
+              <a:t>Git</a:t>
+            </a:r>
+            <a:r>
+              <a:rPr lang="es-GT" dirty="0"/>
+              <a:t> vacío o reinicializa uno existente</a:t>
+            </a:r>
+            <a:endParaRPr lang="es-ES" dirty="0"/>
+          </a:p>
+        </p:txBody>
+      </p:sp>
+    </p:spTree>
+    <p:extLst>
+      <p:ext uri="{BB962C8B-B14F-4D97-AF65-F5344CB8AC3E}">
+        <p14:creationId xmlns:p14="http://schemas.microsoft.com/office/powerpoint/2010/main" val="3391321558"/>
+      </p:ext>
+    </p:extLst>
+  </p:cSld>
+  <p:clrMapOvr>
+    <a:masterClrMapping/>
+  </p:clrMapOvr>
+</p:sld>
+</file>
+
 <file path=ppt/theme/theme1.xml><?xml version="1.0" encoding="utf-8"?>
 <a:theme xmlns:a="http://schemas.openxmlformats.org/drawingml/2006/main" name="Tema de Office">
   <a:themeElements>

</xml_diff>

<commit_message>
sentencia 2 git status. segunda rama creada
</commit_message>
<xml_diff>
--- a/joseMarroquin.pptx
+++ b/joseMarroquin.pptx
@@ -6,6 +6,8 @@
   </p:sldMasterIdLst>
   <p:sldIdLst>
     <p:sldId id="256" r:id="rId2"/>
+    <p:sldId id="257" r:id="rId3"/>
+    <p:sldId id="258" r:id="rId4"/>
   </p:sldIdLst>
   <p:sldSz cx="12192000" cy="6858000"/>
   <p:notesSz cx="6858000" cy="9144000"/>
@@ -104,6 +106,11 @@
       </a:defRPr>
     </a:lvl9pPr>
   </p:defaultTextStyle>
+  <p:extLst>
+    <p:ext uri="{EFAFB233-063F-42B5-8137-9DF3F51BA10A}">
+      <p15:sldGuideLst xmlns:p15="http://schemas.microsoft.com/office/powerpoint/2012/main"/>
+    </p:ext>
+  </p:extLst>
 </p:presentation>
 </file>
 
@@ -3042,6 +3049,184 @@
 </p:sld>
 </file>
 
+<file path=ppt/slides/slide2.xml><?xml version="1.0" encoding="utf-8"?>
+<p:sld xmlns:a="http://schemas.openxmlformats.org/drawingml/2006/main" xmlns:r="http://schemas.openxmlformats.org/officeDocument/2006/relationships" xmlns:p="http://schemas.openxmlformats.org/presentationml/2006/main">
+  <p:cSld>
+    <p:spTree>
+      <p:nvGrpSpPr>
+        <p:cNvPr id="1" name=""/>
+        <p:cNvGrpSpPr/>
+        <p:nvPr/>
+      </p:nvGrpSpPr>
+      <p:grpSpPr>
+        <a:xfrm>
+          <a:off x="0" y="0"/>
+          <a:ext cx="0" cy="0"/>
+          <a:chOff x="0" y="0"/>
+          <a:chExt cx="0" cy="0"/>
+        </a:xfrm>
+      </p:grpSpPr>
+      <p:sp>
+        <p:nvSpPr>
+          <p:cNvPr id="2" name="Título 1"/>
+          <p:cNvSpPr>
+            <a:spLocks noGrp="1"/>
+          </p:cNvSpPr>
+          <p:nvPr>
+            <p:ph type="title"/>
+          </p:nvPr>
+        </p:nvSpPr>
+        <p:spPr/>
+        <p:txBody>
+          <a:bodyPr/>
+          <a:lstStyle/>
+          <a:p>
+            <a:pPr algn="ctr"/>
+            <a:r>
+              <a:rPr lang="es-GT" dirty="0" err="1" smtClean="0"/>
+              <a:t>git</a:t>
+            </a:r>
+            <a:r>
+              <a:rPr lang="es-GT" dirty="0" smtClean="0"/>
+              <a:t> </a:t>
+            </a:r>
+            <a:r>
+              <a:rPr lang="es-GT" dirty="0" err="1" smtClean="0"/>
+              <a:t>init</a:t>
+            </a:r>
+            <a:endParaRPr lang="es-ES" dirty="0"/>
+          </a:p>
+        </p:txBody>
+      </p:sp>
+      <p:sp>
+        <p:nvSpPr>
+          <p:cNvPr id="3" name="Marcador de contenido 2"/>
+          <p:cNvSpPr>
+            <a:spLocks noGrp="1"/>
+          </p:cNvSpPr>
+          <p:nvPr>
+            <p:ph idx="1"/>
+          </p:nvPr>
+        </p:nvSpPr>
+        <p:spPr/>
+        <p:txBody>
+          <a:bodyPr/>
+          <a:lstStyle/>
+          <a:p>
+            <a:r>
+              <a:rPr lang="es-GT" dirty="0"/>
+              <a:t>Crea un repositorio </a:t>
+            </a:r>
+            <a:r>
+              <a:rPr lang="es-GT" dirty="0" err="1"/>
+              <a:t>Git</a:t>
+            </a:r>
+            <a:r>
+              <a:rPr lang="es-GT" dirty="0"/>
+              <a:t> vacío o reinicializa uno existente</a:t>
+            </a:r>
+            <a:endParaRPr lang="es-ES" dirty="0"/>
+          </a:p>
+        </p:txBody>
+      </p:sp>
+    </p:spTree>
+    <p:extLst>
+      <p:ext uri="{BB962C8B-B14F-4D97-AF65-F5344CB8AC3E}">
+        <p14:creationId xmlns:p14="http://schemas.microsoft.com/office/powerpoint/2010/main" val="3391321558"/>
+      </p:ext>
+    </p:extLst>
+  </p:cSld>
+  <p:clrMapOvr>
+    <a:masterClrMapping/>
+  </p:clrMapOvr>
+</p:sld>
+</file>
+
+<file path=ppt/slides/slide3.xml><?xml version="1.0" encoding="utf-8"?>
+<p:sld xmlns:a="http://schemas.openxmlformats.org/drawingml/2006/main" xmlns:r="http://schemas.openxmlformats.org/officeDocument/2006/relationships" xmlns:p="http://schemas.openxmlformats.org/presentationml/2006/main">
+  <p:cSld>
+    <p:spTree>
+      <p:nvGrpSpPr>
+        <p:cNvPr id="1" name=""/>
+        <p:cNvGrpSpPr/>
+        <p:nvPr/>
+      </p:nvGrpSpPr>
+      <p:grpSpPr>
+        <a:xfrm>
+          <a:off x="0" y="0"/>
+          <a:ext cx="0" cy="0"/>
+          <a:chOff x="0" y="0"/>
+          <a:chExt cx="0" cy="0"/>
+        </a:xfrm>
+      </p:grpSpPr>
+      <p:sp>
+        <p:nvSpPr>
+          <p:cNvPr id="2" name="Título 1"/>
+          <p:cNvSpPr>
+            <a:spLocks noGrp="1"/>
+          </p:cNvSpPr>
+          <p:nvPr>
+            <p:ph type="title"/>
+          </p:nvPr>
+        </p:nvSpPr>
+        <p:spPr/>
+        <p:txBody>
+          <a:bodyPr/>
+          <a:lstStyle/>
+          <a:p>
+            <a:pPr algn="ctr"/>
+            <a:r>
+              <a:rPr lang="es-GT" dirty="0" err="1" smtClean="0"/>
+              <a:t>Git</a:t>
+            </a:r>
+            <a:r>
+              <a:rPr lang="es-GT" dirty="0" smtClean="0"/>
+              <a:t> status</a:t>
+            </a:r>
+            <a:endParaRPr lang="es-ES" dirty="0"/>
+          </a:p>
+        </p:txBody>
+      </p:sp>
+      <p:sp>
+        <p:nvSpPr>
+          <p:cNvPr id="3" name="Marcador de contenido 2"/>
+          <p:cNvSpPr>
+            <a:spLocks noGrp="1"/>
+          </p:cNvSpPr>
+          <p:nvPr>
+            <p:ph idx="1"/>
+          </p:nvPr>
+        </p:nvSpPr>
+        <p:spPr/>
+        <p:txBody>
+          <a:bodyPr/>
+          <a:lstStyle/>
+          <a:p>
+            <a:r>
+              <a:rPr lang="es-GT" dirty="0"/>
+              <a:t>te mostrará los diferentes estados de los archivos en tu directorio de trabajo y área de ensayo. </a:t>
+            </a:r>
+            <a:r>
+              <a:rPr lang="es-GT"/>
+              <a:t>Qué archivos están modificados y sin seguimiento y cuáles con seguimiento pero no confirmados aún. </a:t>
+            </a:r>
+            <a:endParaRPr lang="es-ES" dirty="0"/>
+          </a:p>
+        </p:txBody>
+      </p:sp>
+    </p:spTree>
+    <p:extLst>
+      <p:ext uri="{BB962C8B-B14F-4D97-AF65-F5344CB8AC3E}">
+        <p14:creationId xmlns:p14="http://schemas.microsoft.com/office/powerpoint/2010/main" val="263117606"/>
+      </p:ext>
+    </p:extLst>
+  </p:cSld>
+  <p:clrMapOvr>
+    <a:masterClrMapping/>
+  </p:clrMapOvr>
+</p:sld>
+</file>
+
 <file path=ppt/theme/theme1.xml><?xml version="1.0" encoding="utf-8"?>
 <a:theme xmlns:a="http://schemas.openxmlformats.org/drawingml/2006/main" name="Tema de Office">
   <a:themeElements>

</xml_diff>

<commit_message>
sentencia 3 git add y creacion de la tercera rama
</commit_message>
<xml_diff>
--- a/joseMarroquin.pptx
+++ b/joseMarroquin.pptx
@@ -8,6 +8,7 @@
     <p:sldId id="256" r:id="rId2"/>
     <p:sldId id="257" r:id="rId3"/>
     <p:sldId id="258" r:id="rId4"/>
+    <p:sldId id="259" r:id="rId5"/>
   </p:sldIdLst>
   <p:sldSz cx="12192000" cy="6858000"/>
   <p:notesSz cx="6858000" cy="9144000"/>
@@ -3227,6 +3228,163 @@
 </p:sld>
 </file>
 
+<file path=ppt/slides/slide4.xml><?xml version="1.0" encoding="utf-8"?>
+<p:sld xmlns:a="http://schemas.openxmlformats.org/drawingml/2006/main" xmlns:r="http://schemas.openxmlformats.org/officeDocument/2006/relationships" xmlns:p="http://schemas.openxmlformats.org/presentationml/2006/main">
+  <p:cSld>
+    <p:spTree>
+      <p:nvGrpSpPr>
+        <p:cNvPr id="1" name=""/>
+        <p:cNvGrpSpPr/>
+        <p:nvPr/>
+      </p:nvGrpSpPr>
+      <p:grpSpPr>
+        <a:xfrm>
+          <a:off x="0" y="0"/>
+          <a:ext cx="0" cy="0"/>
+          <a:chOff x="0" y="0"/>
+          <a:chExt cx="0" cy="0"/>
+        </a:xfrm>
+      </p:grpSpPr>
+      <p:sp>
+        <p:nvSpPr>
+          <p:cNvPr id="2" name="Título 1"/>
+          <p:cNvSpPr>
+            <a:spLocks noGrp="1"/>
+          </p:cNvSpPr>
+          <p:nvPr>
+            <p:ph type="title"/>
+          </p:nvPr>
+        </p:nvSpPr>
+        <p:spPr/>
+        <p:txBody>
+          <a:bodyPr/>
+          <a:lstStyle/>
+          <a:p>
+            <a:pPr algn="ctr"/>
+            <a:r>
+              <a:rPr lang="es-GT" dirty="0" err="1" smtClean="0"/>
+              <a:t>Git</a:t>
+            </a:r>
+            <a:r>
+              <a:rPr lang="es-GT" dirty="0" smtClean="0"/>
+              <a:t> </a:t>
+            </a:r>
+            <a:r>
+              <a:rPr lang="es-GT" dirty="0" err="1" smtClean="0"/>
+              <a:t>add</a:t>
+            </a:r>
+            <a:endParaRPr lang="es-ES" dirty="0"/>
+          </a:p>
+        </p:txBody>
+      </p:sp>
+      <p:sp>
+        <p:nvSpPr>
+          <p:cNvPr id="3" name="Marcador de contenido 2"/>
+          <p:cNvSpPr>
+            <a:spLocks noGrp="1"/>
+          </p:cNvSpPr>
+          <p:nvPr>
+            <p:ph idx="1"/>
+          </p:nvPr>
+        </p:nvSpPr>
+        <p:spPr/>
+        <p:txBody>
+          <a:bodyPr/>
+          <a:lstStyle/>
+          <a:p>
+            <a:r>
+              <a:rPr lang="es-GT" dirty="0"/>
+              <a:t>El comando </a:t>
+            </a:r>
+            <a:r>
+              <a:rPr lang="es-GT" dirty="0" err="1"/>
+              <a:t>git</a:t>
+            </a:r>
+            <a:r>
+              <a:rPr lang="es-GT" dirty="0"/>
+              <a:t> </a:t>
+            </a:r>
+            <a:r>
+              <a:rPr lang="es-GT" dirty="0" err="1"/>
+              <a:t>add</a:t>
+            </a:r>
+            <a:r>
+              <a:rPr lang="es-GT" dirty="0"/>
+              <a:t> añade contenido del directorio de trabajo al área de ensayo (</a:t>
+            </a:r>
+            <a:r>
+              <a:rPr lang="es-GT" dirty="0" err="1"/>
+              <a:t>staging</a:t>
+            </a:r>
+            <a:r>
+              <a:rPr lang="es-GT" dirty="0"/>
+              <a:t> </a:t>
+            </a:r>
+            <a:r>
+              <a:rPr lang="es-GT" dirty="0" err="1"/>
+              <a:t>area</a:t>
+            </a:r>
+            <a:r>
+              <a:rPr lang="es-GT" dirty="0"/>
+              <a:t> o '</a:t>
+            </a:r>
+            <a:r>
+              <a:rPr lang="es-GT" dirty="0" err="1"/>
+              <a:t>index</a:t>
+            </a:r>
+            <a:r>
+              <a:rPr lang="es-GT" dirty="0"/>
+              <a:t>') para la próxima confirmación. Cuando se ejecuta el comando </a:t>
+            </a:r>
+            <a:r>
+              <a:rPr lang="es-GT" dirty="0" err="1"/>
+              <a:t>git</a:t>
+            </a:r>
+            <a:r>
+              <a:rPr lang="es-GT" dirty="0"/>
+              <a:t> </a:t>
+            </a:r>
+            <a:r>
+              <a:rPr lang="es-GT" dirty="0" err="1"/>
+              <a:t>commit</a:t>
+            </a:r>
+            <a:r>
+              <a:rPr lang="es-GT" dirty="0"/>
+              <a:t>, éste, de forma predeterminada, sólo mira en esta área de ensayo, por lo que </a:t>
+            </a:r>
+            <a:r>
+              <a:rPr lang="es-GT" dirty="0" err="1"/>
+              <a:t>git</a:t>
+            </a:r>
+            <a:r>
+              <a:rPr lang="es-GT" dirty="0"/>
+              <a:t> </a:t>
+            </a:r>
+            <a:r>
+              <a:rPr lang="es-GT" dirty="0" err="1"/>
+              <a:t>add</a:t>
+            </a:r>
+            <a:r>
+              <a:rPr lang="es-GT"/>
+              <a:t> se utiliza para fabricar exactamente lo que te gustaría fuese tu próxima instantánea a confirmar.</a:t>
+            </a:r>
+            <a:endParaRPr lang="es-ES" dirty="0"/>
+          </a:p>
+        </p:txBody>
+      </p:sp>
+    </p:spTree>
+    <p:extLst>
+      <p:ext uri="{BB962C8B-B14F-4D97-AF65-F5344CB8AC3E}">
+        <p14:creationId xmlns:p14="http://schemas.microsoft.com/office/powerpoint/2010/main" val="482501557"/>
+      </p:ext>
+    </p:extLst>
+  </p:cSld>
+  <p:clrMapOvr>
+    <a:masterClrMapping/>
+  </p:clrMapOvr>
+</p:sld>
+</file>
+
 <file path=ppt/theme/theme1.xml><?xml version="1.0" encoding="utf-8"?>
 <a:theme xmlns:a="http://schemas.openxmlformats.org/drawingml/2006/main" name="Tema de Office">
   <a:themeElements>

</xml_diff>

<commit_message>
sentencia 4 git commit y creacion de rama 4
</commit_message>
<xml_diff>
--- a/joseMarroquin.pptx
+++ b/joseMarroquin.pptx
@@ -9,6 +9,7 @@
     <p:sldId id="257" r:id="rId3"/>
     <p:sldId id="258" r:id="rId4"/>
     <p:sldId id="259" r:id="rId5"/>
+    <p:sldId id="260" r:id="rId6"/>
   </p:sldIdLst>
   <p:sldSz cx="12192000" cy="6858000"/>
   <p:notesSz cx="6858000" cy="9144000"/>
@@ -3385,6 +3386,123 @@
 </p:sld>
 </file>
 
+<file path=ppt/slides/slide5.xml><?xml version="1.0" encoding="utf-8"?>
+<p:sld xmlns:a="http://schemas.openxmlformats.org/drawingml/2006/main" xmlns:r="http://schemas.openxmlformats.org/officeDocument/2006/relationships" xmlns:p="http://schemas.openxmlformats.org/presentationml/2006/main">
+  <p:cSld>
+    <p:spTree>
+      <p:nvGrpSpPr>
+        <p:cNvPr id="1" name=""/>
+        <p:cNvGrpSpPr/>
+        <p:nvPr/>
+      </p:nvGrpSpPr>
+      <p:grpSpPr>
+        <a:xfrm>
+          <a:off x="0" y="0"/>
+          <a:ext cx="0" cy="0"/>
+          <a:chOff x="0" y="0"/>
+          <a:chExt cx="0" cy="0"/>
+        </a:xfrm>
+      </p:grpSpPr>
+      <p:sp>
+        <p:nvSpPr>
+          <p:cNvPr id="2" name="Título 1"/>
+          <p:cNvSpPr>
+            <a:spLocks noGrp="1"/>
+          </p:cNvSpPr>
+          <p:nvPr>
+            <p:ph type="title"/>
+          </p:nvPr>
+        </p:nvSpPr>
+        <p:spPr/>
+        <p:txBody>
+          <a:bodyPr/>
+          <a:lstStyle/>
+          <a:p>
+            <a:pPr algn="ctr"/>
+            <a:r>
+              <a:rPr lang="es-GT" dirty="0" err="1" smtClean="0"/>
+              <a:t>Git</a:t>
+            </a:r>
+            <a:r>
+              <a:rPr lang="es-GT" dirty="0" smtClean="0"/>
+              <a:t> </a:t>
+            </a:r>
+            <a:r>
+              <a:rPr lang="es-GT" dirty="0" err="1" smtClean="0"/>
+              <a:t>commit</a:t>
+            </a:r>
+            <a:endParaRPr lang="es-ES" dirty="0"/>
+          </a:p>
+        </p:txBody>
+      </p:sp>
+      <p:sp>
+        <p:nvSpPr>
+          <p:cNvPr id="3" name="Marcador de contenido 2"/>
+          <p:cNvSpPr>
+            <a:spLocks noGrp="1"/>
+          </p:cNvSpPr>
+          <p:nvPr>
+            <p:ph idx="1"/>
+          </p:nvPr>
+        </p:nvSpPr>
+        <p:spPr/>
+        <p:txBody>
+          <a:bodyPr/>
+          <a:lstStyle/>
+          <a:p>
+            <a:r>
+              <a:rPr lang="es-GT" dirty="0"/>
+              <a:t>El comando </a:t>
+            </a:r>
+            <a:r>
+              <a:rPr lang="es-GT" dirty="0" err="1"/>
+              <a:t>git</a:t>
+            </a:r>
+            <a:r>
+              <a:rPr lang="es-GT" dirty="0"/>
+              <a:t> </a:t>
+            </a:r>
+            <a:r>
+              <a:rPr lang="es-GT" dirty="0" err="1"/>
+              <a:t>commit</a:t>
+            </a:r>
+            <a:r>
+              <a:rPr lang="es-GT" dirty="0"/>
+              <a:t> toma todos los contenidos de los archivos a los que se les realiza el seguimiento con </a:t>
+            </a:r>
+            <a:r>
+              <a:rPr lang="es-GT" dirty="0" err="1"/>
+              <a:t>git</a:t>
+            </a:r>
+            <a:r>
+              <a:rPr lang="es-GT" dirty="0"/>
+              <a:t> </a:t>
+            </a:r>
+            <a:r>
+              <a:rPr lang="es-GT" dirty="0" err="1"/>
+              <a:t>add</a:t>
+            </a:r>
+            <a:r>
+              <a:rPr lang="es-GT"/>
+              <a:t> y registra una nueva instantánea permanente en la base de datos y luego avanza el puntero de la rama en la rama actual.</a:t>
+            </a:r>
+            <a:endParaRPr lang="es-ES" dirty="0"/>
+          </a:p>
+        </p:txBody>
+      </p:sp>
+    </p:spTree>
+    <p:extLst>
+      <p:ext uri="{BB962C8B-B14F-4D97-AF65-F5344CB8AC3E}">
+        <p14:creationId xmlns:p14="http://schemas.microsoft.com/office/powerpoint/2010/main" val="4158067140"/>
+      </p:ext>
+    </p:extLst>
+  </p:cSld>
+  <p:clrMapOvr>
+    <a:masterClrMapping/>
+  </p:clrMapOvr>
+</p:sld>
+</file>
+
 <file path=ppt/theme/theme1.xml><?xml version="1.0" encoding="utf-8"?>
 <a:theme xmlns:a="http://schemas.openxmlformats.org/drawingml/2006/main" name="Tema de Office">
   <a:themeElements>

</xml_diff>

<commit_message>
sentencia 5 git clone y quinta rama creada
</commit_message>
<xml_diff>
--- a/joseMarroquin.pptx
+++ b/joseMarroquin.pptx
@@ -10,6 +10,7 @@
     <p:sldId id="258" r:id="rId4"/>
     <p:sldId id="259" r:id="rId5"/>
     <p:sldId id="260" r:id="rId6"/>
+    <p:sldId id="261" r:id="rId7"/>
   </p:sldIdLst>
   <p:sldSz cx="12192000" cy="6858000"/>
   <p:notesSz cx="6858000" cy="9144000"/>
@@ -3503,6 +3504,87 @@
 </p:sld>
 </file>
 
+<file path=ppt/slides/slide6.xml><?xml version="1.0" encoding="utf-8"?>
+<p:sld xmlns:a="http://schemas.openxmlformats.org/drawingml/2006/main" xmlns:r="http://schemas.openxmlformats.org/officeDocument/2006/relationships" xmlns:p="http://schemas.openxmlformats.org/presentationml/2006/main">
+  <p:cSld>
+    <p:spTree>
+      <p:nvGrpSpPr>
+        <p:cNvPr id="1" name=""/>
+        <p:cNvGrpSpPr/>
+        <p:nvPr/>
+      </p:nvGrpSpPr>
+      <p:grpSpPr>
+        <a:xfrm>
+          <a:off x="0" y="0"/>
+          <a:ext cx="0" cy="0"/>
+          <a:chOff x="0" y="0"/>
+          <a:chExt cx="0" cy="0"/>
+        </a:xfrm>
+      </p:grpSpPr>
+      <p:sp>
+        <p:nvSpPr>
+          <p:cNvPr id="2" name="Título 1"/>
+          <p:cNvSpPr>
+            <a:spLocks noGrp="1"/>
+          </p:cNvSpPr>
+          <p:nvPr>
+            <p:ph type="title"/>
+          </p:nvPr>
+        </p:nvSpPr>
+        <p:spPr/>
+        <p:txBody>
+          <a:bodyPr/>
+          <a:lstStyle/>
+          <a:p>
+            <a:pPr algn="ctr"/>
+            <a:r>
+              <a:rPr lang="es-GT" dirty="0" err="1" smtClean="0"/>
+              <a:t>Git</a:t>
+            </a:r>
+            <a:r>
+              <a:rPr lang="es-GT" dirty="0" smtClean="0"/>
+              <a:t> clone</a:t>
+            </a:r>
+            <a:endParaRPr lang="es-ES" dirty="0"/>
+          </a:p>
+        </p:txBody>
+      </p:sp>
+      <p:sp>
+        <p:nvSpPr>
+          <p:cNvPr id="3" name="Marcador de contenido 2"/>
+          <p:cNvSpPr>
+            <a:spLocks noGrp="1"/>
+          </p:cNvSpPr>
+          <p:nvPr>
+            <p:ph idx="1"/>
+          </p:nvPr>
+        </p:nvSpPr>
+        <p:spPr/>
+        <p:txBody>
+          <a:bodyPr/>
+          <a:lstStyle/>
+          <a:p>
+            <a:r>
+              <a:rPr lang="es-GT"/>
+              <a:t>Este comando se usa con el propósito de revisar repertorios</a:t>
+            </a:r>
+            <a:endParaRPr lang="es-ES"/>
+          </a:p>
+        </p:txBody>
+      </p:sp>
+    </p:spTree>
+    <p:extLst>
+      <p:ext uri="{BB962C8B-B14F-4D97-AF65-F5344CB8AC3E}">
+        <p14:creationId xmlns:p14="http://schemas.microsoft.com/office/powerpoint/2010/main" val="3897264025"/>
+      </p:ext>
+    </p:extLst>
+  </p:cSld>
+  <p:clrMapOvr>
+    <a:masterClrMapping/>
+  </p:clrMapOvr>
+</p:sld>
+</file>
+
 <file path=ppt/theme/theme1.xml><?xml version="1.0" encoding="utf-8"?>
 <a:theme xmlns:a="http://schemas.openxmlformats.org/drawingml/2006/main" name="Tema de Office">
   <a:themeElements>

</xml_diff>